<commit_message>
Home pagge , usermanagement and order
</commit_message>
<xml_diff>
--- a/Muck up project.pptx
+++ b/Muck up project.pptx
@@ -269,7 +269,7 @@
           <a:p>
             <a:fld id="{05DD8CB8-BCAE-4176-9B00-3C63B726CDBB}" type="datetimeFigureOut">
               <a:rPr lang="en-US" smtClean="0"/>
-              <a:t>8/16/2021</a:t>
+              <a:t>8/17/2021</a:t>
             </a:fld>
             <a:endParaRPr lang="en-US"/>
           </a:p>
@@ -467,7 +467,7 @@
           <a:p>
             <a:fld id="{05DD8CB8-BCAE-4176-9B00-3C63B726CDBB}" type="datetimeFigureOut">
               <a:rPr lang="en-US" smtClean="0"/>
-              <a:t>8/16/2021</a:t>
+              <a:t>8/17/2021</a:t>
             </a:fld>
             <a:endParaRPr lang="en-US"/>
           </a:p>
@@ -675,7 +675,7 @@
           <a:p>
             <a:fld id="{05DD8CB8-BCAE-4176-9B00-3C63B726CDBB}" type="datetimeFigureOut">
               <a:rPr lang="en-US" smtClean="0"/>
-              <a:t>8/16/2021</a:t>
+              <a:t>8/17/2021</a:t>
             </a:fld>
             <a:endParaRPr lang="en-US"/>
           </a:p>
@@ -873,7 +873,7 @@
           <a:p>
             <a:fld id="{05DD8CB8-BCAE-4176-9B00-3C63B726CDBB}" type="datetimeFigureOut">
               <a:rPr lang="en-US" smtClean="0"/>
-              <a:t>8/16/2021</a:t>
+              <a:t>8/17/2021</a:t>
             </a:fld>
             <a:endParaRPr lang="en-US"/>
           </a:p>
@@ -1148,7 +1148,7 @@
           <a:p>
             <a:fld id="{05DD8CB8-BCAE-4176-9B00-3C63B726CDBB}" type="datetimeFigureOut">
               <a:rPr lang="en-US" smtClean="0"/>
-              <a:t>8/16/2021</a:t>
+              <a:t>8/17/2021</a:t>
             </a:fld>
             <a:endParaRPr lang="en-US"/>
           </a:p>
@@ -1413,7 +1413,7 @@
           <a:p>
             <a:fld id="{05DD8CB8-BCAE-4176-9B00-3C63B726CDBB}" type="datetimeFigureOut">
               <a:rPr lang="en-US" smtClean="0"/>
-              <a:t>8/16/2021</a:t>
+              <a:t>8/17/2021</a:t>
             </a:fld>
             <a:endParaRPr lang="en-US"/>
           </a:p>
@@ -1825,7 +1825,7 @@
           <a:p>
             <a:fld id="{05DD8CB8-BCAE-4176-9B00-3C63B726CDBB}" type="datetimeFigureOut">
               <a:rPr lang="en-US" smtClean="0"/>
-              <a:t>8/16/2021</a:t>
+              <a:t>8/17/2021</a:t>
             </a:fld>
             <a:endParaRPr lang="en-US"/>
           </a:p>
@@ -1966,7 +1966,7 @@
           <a:p>
             <a:fld id="{05DD8CB8-BCAE-4176-9B00-3C63B726CDBB}" type="datetimeFigureOut">
               <a:rPr lang="en-US" smtClean="0"/>
-              <a:t>8/16/2021</a:t>
+              <a:t>8/17/2021</a:t>
             </a:fld>
             <a:endParaRPr lang="en-US"/>
           </a:p>
@@ -2079,7 +2079,7 @@
           <a:p>
             <a:fld id="{05DD8CB8-BCAE-4176-9B00-3C63B726CDBB}" type="datetimeFigureOut">
               <a:rPr lang="en-US" smtClean="0"/>
-              <a:t>8/16/2021</a:t>
+              <a:t>8/17/2021</a:t>
             </a:fld>
             <a:endParaRPr lang="en-US"/>
           </a:p>
@@ -2390,7 +2390,7 @@
           <a:p>
             <a:fld id="{05DD8CB8-BCAE-4176-9B00-3C63B726CDBB}" type="datetimeFigureOut">
               <a:rPr lang="en-US" smtClean="0"/>
-              <a:t>8/16/2021</a:t>
+              <a:t>8/17/2021</a:t>
             </a:fld>
             <a:endParaRPr lang="en-US"/>
           </a:p>
@@ -2678,7 +2678,7 @@
           <a:p>
             <a:fld id="{05DD8CB8-BCAE-4176-9B00-3C63B726CDBB}" type="datetimeFigureOut">
               <a:rPr lang="en-US" smtClean="0"/>
-              <a:t>8/16/2021</a:t>
+              <a:t>8/17/2021</a:t>
             </a:fld>
             <a:endParaRPr lang="en-US"/>
           </a:p>
@@ -2919,7 +2919,7 @@
           <a:p>
             <a:fld id="{05DD8CB8-BCAE-4176-9B00-3C63B726CDBB}" type="datetimeFigureOut">
               <a:rPr lang="en-US" smtClean="0"/>
-              <a:t>8/16/2021</a:t>
+              <a:t>8/17/2021</a:t>
             </a:fld>
             <a:endParaRPr lang="en-US"/>
           </a:p>
@@ -3404,7 +3404,7 @@
         </p:nvSpPr>
         <p:spPr>
           <a:xfrm>
-            <a:off x="1667369" y="135119"/>
+            <a:off x="454563" y="105466"/>
             <a:ext cx="1738300" cy="461665"/>
           </a:xfrm>
           <a:prstGeom prst="rect">
@@ -3419,12 +3419,12 @@
           <a:lstStyle/>
           <a:p>
             <a:r>
-              <a:rPr lang="en-US" sz="2400" dirty="0" err="1">
+              <a:rPr lang="en-US" sz="2400" dirty="0">
                 <a:solidFill>
                   <a:schemeClr val="bg1"/>
                 </a:solidFill>
               </a:rPr>
-              <a:t>Khmershop</a:t>
+              <a:t>T-shop</a:t>
             </a:r>
             <a:endParaRPr lang="en-US" sz="2000" dirty="0">
               <a:solidFill>
@@ -4092,45 +4092,6 @@
           </a:extLst>
         </p:spPr>
       </p:pic>
-      <p:sp>
-        <p:nvSpPr>
-          <p:cNvPr id="26" name="TextBox 25">
-            <a:extLst>
-              <a:ext uri="{FF2B5EF4-FFF2-40B4-BE49-F238E27FC236}">
-                <a16:creationId xmlns:a16="http://schemas.microsoft.com/office/drawing/2014/main" id="{0BFE1ADD-AEEC-415D-A62E-D814D11A59F5}"/>
-              </a:ext>
-            </a:extLst>
-          </p:cNvPr>
-          <p:cNvSpPr txBox="1"/>
-          <p:nvPr/>
-        </p:nvSpPr>
-        <p:spPr>
-          <a:xfrm>
-            <a:off x="471936" y="219196"/>
-            <a:ext cx="840020" cy="369332"/>
-          </a:xfrm>
-          <a:prstGeom prst="rect">
-            <a:avLst/>
-          </a:prstGeom>
-          <a:noFill/>
-        </p:spPr>
-        <p:txBody>
-          <a:bodyPr wrap="square" rtlCol="0">
-            <a:spAutoFit/>
-          </a:bodyPr>
-          <a:lstStyle/>
-          <a:p>
-            <a:r>
-              <a:rPr lang="en-US" dirty="0">
-                <a:solidFill>
-                  <a:schemeClr val="bg1"/>
-                </a:solidFill>
-              </a:rPr>
-              <a:t>LOGO</a:t>
-            </a:r>
-          </a:p>
-        </p:txBody>
-      </p:sp>
     </p:spTree>
     <p:extLst>
       <p:ext uri="{BB962C8B-B14F-4D97-AF65-F5344CB8AC3E}">

</xml_diff>